<commit_message>
Added UQ to library slides
</commit_message>
<xml_diff>
--- a/2020/ECP/slides/03-library.pptx
+++ b/2020/ECP/slides/03-library.pptx
@@ -278,7 +278,7 @@
           <a:p>
             <a:fld id="{0B842F42-2CE9-4E35-95C1-410DC08A50B1}" type="datetimeFigureOut">
               <a:rPr lang="en-US" smtClean="0"/>
-              <a:t>1/27/20</a:t>
+              <a:t>1/29/20</a:t>
             </a:fld>
             <a:endParaRPr lang="en-US"/>
           </a:p>
@@ -443,7 +443,7 @@
           <a:p>
             <a:fld id="{6F282904-F315-4730-8D91-37D99E141A6F}" type="datetimeFigureOut">
               <a:rPr lang="en-US" smtClean="0"/>
-              <a:t>1/27/20</a:t>
+              <a:t>1/29/20</a:t>
             </a:fld>
             <a:endParaRPr lang="en-US"/>
           </a:p>
@@ -5203,7 +5203,12 @@
             <p:ph idx="1"/>
           </p:nvPr>
         </p:nvSpPr>
-        <p:spPr/>
+        <p:spPr>
+          <a:xfrm>
+            <a:off x="365760" y="1057451"/>
+            <a:ext cx="11369809" cy="4047778"/>
+          </a:xfrm>
+        </p:spPr>
         <p:txBody>
           <a:bodyPr/>
           <a:lstStyle/>
@@ -5394,6 +5399,37 @@
               </a:rPr>
               <a:t> “run2”</a:t>
             </a:r>
+          </a:p>
+          <a:p>
+            <a:r>
+              <a:rPr lang="en-US" sz="2400" dirty="0"/>
+              <a:t>Basic NAS via layer size/shape modification</a:t>
+            </a:r>
+          </a:p>
+          <a:p>
+            <a:pPr lvl="1"/>
+            <a:r>
+              <a:rPr lang="en-US" sz="2000" dirty="0">
+                <a:latin typeface="Consolas" panose="020B0609020204030204" pitchFamily="49" charset="0"/>
+                <a:cs typeface="Consolas" panose="020B0609020204030204" pitchFamily="49" charset="0"/>
+              </a:rPr>
+              <a:t>‘--</a:t>
+            </a:r>
+            <a:r>
+              <a:rPr lang="en-US" sz="2000" dirty="0" err="1">
+                <a:latin typeface="Consolas" panose="020B0609020204030204" pitchFamily="49" charset="0"/>
+                <a:cs typeface="Consolas" panose="020B0609020204030204" pitchFamily="49" charset="0"/>
+              </a:rPr>
+              <a:t>shared_nnet_spec</a:t>
+            </a:r>
+            <a:r>
+              <a:rPr lang="en-US" sz="2000" dirty="0">
+                <a:latin typeface="Consolas" panose="020B0609020204030204" pitchFamily="49" charset="0"/>
+                <a:cs typeface="Consolas" panose="020B0609020204030204" pitchFamily="49" charset="0"/>
+              </a:rPr>
+              <a:t> '1200, 600’’</a:t>
+            </a:r>
+            <a:endParaRPr lang="en-US" sz="2000" dirty="0"/>
           </a:p>
           <a:p>
             <a:r>
@@ -8991,18 +9027,18 @@
 </file>
 
 <file path=customXml/item1.xml><?xml version="1.0" encoding="utf-8"?>
+<p:properties xmlns:p="http://schemas.microsoft.com/office/2006/metadata/properties" xmlns:xsi="http://www.w3.org/2001/XMLSchema-instance" xmlns:pc="http://schemas.microsoft.com/office/infopath/2007/PartnerControls">
+  <documentManagement/>
+</p:properties>
+</file>
+
+<file path=customXml/item2.xml><?xml version="1.0" encoding="utf-8"?>
 <?mso-contentType ?>
 <FormTemplates xmlns="http://schemas.microsoft.com/sharepoint/v3/contenttype/forms">
   <Display>DocumentLibraryForm</Display>
   <Edit>DocumentLibraryForm</Edit>
   <New>DocumentLibraryForm</New>
 </FormTemplates>
-</file>
-
-<file path=customXml/item2.xml><?xml version="1.0" encoding="utf-8"?>
-<p:properties xmlns:p="http://schemas.microsoft.com/office/2006/metadata/properties" xmlns:xsi="http://www.w3.org/2001/XMLSchema-instance" xmlns:pc="http://schemas.microsoft.com/office/infopath/2007/PartnerControls">
-  <documentManagement/>
-</p:properties>
 </file>
 
 <file path=customXml/item3.xml><?xml version="1.0" encoding="utf-8"?>
@@ -9055,14 +9091,6 @@
 </file>
 
 <file path=customXml/itemProps1.xml><?xml version="1.0" encoding="utf-8"?>
-<ds:datastoreItem xmlns:ds="http://schemas.openxmlformats.org/officeDocument/2006/customXml" ds:itemID="{19E20559-B232-4371-8690-E3D8007EDB82}">
-  <ds:schemaRefs>
-    <ds:schemaRef ds:uri="http://schemas.microsoft.com/sharepoint/v3/contenttype/forms"/>
-  </ds:schemaRefs>
-</ds:datastoreItem>
-</file>
-
-<file path=customXml/itemProps2.xml><?xml version="1.0" encoding="utf-8"?>
 <ds:datastoreItem xmlns:ds="http://schemas.openxmlformats.org/officeDocument/2006/customXml" ds:itemID="{A50EC660-24D0-43A0-AE5E-E274115E726B}">
   <ds:schemaRefs>
     <ds:schemaRef ds:uri="http://purl.org/dc/dcmitype/"/>
@@ -9073,6 +9101,14 @@
     <ds:schemaRef ds:uri="http://www.w3.org/XML/1998/namespace"/>
     <ds:schemaRef ds:uri="http://purl.org/dc/terms/"/>
     <ds:schemaRef ds:uri="http://schemas.microsoft.com/office/infopath/2007/PartnerControls"/>
+  </ds:schemaRefs>
+</ds:datastoreItem>
+</file>
+
+<file path=customXml/itemProps2.xml><?xml version="1.0" encoding="utf-8"?>
+<ds:datastoreItem xmlns:ds="http://schemas.openxmlformats.org/officeDocument/2006/customXml" ds:itemID="{19E20559-B232-4371-8690-E3D8007EDB82}">
+  <ds:schemaRefs>
+    <ds:schemaRef ds:uri="http://schemas.microsoft.com/sharepoint/v3/contenttype/forms"/>
   </ds:schemaRefs>
 </ds:datastoreItem>
 </file>

</xml_diff>

<commit_message>
Added slide for Exalearn/RL support
</commit_message>
<xml_diff>
--- a/2020/ECP/slides/03-library.pptx
+++ b/2020/ECP/slides/03-library.pptx
@@ -5,10 +5,10 @@
     <p:sldMasterId id="2147483935" r:id="rId4"/>
   </p:sldMasterIdLst>
   <p:notesMasterIdLst>
-    <p:notesMasterId r:id="rId23"/>
+    <p:notesMasterId r:id="rId22"/>
   </p:notesMasterIdLst>
   <p:handoutMasterIdLst>
-    <p:handoutMasterId r:id="rId24"/>
+    <p:handoutMasterId r:id="rId23"/>
   </p:handoutMasterIdLst>
   <p:sldIdLst>
     <p:sldId id="385" r:id="rId5"/>
@@ -24,11 +24,10 @@
     <p:sldId id="415" r:id="rId15"/>
     <p:sldId id="414" r:id="rId16"/>
     <p:sldId id="416" r:id="rId17"/>
-    <p:sldId id="393" r:id="rId18"/>
-    <p:sldId id="420" r:id="rId19"/>
-    <p:sldId id="409" r:id="rId20"/>
-    <p:sldId id="410" r:id="rId21"/>
-    <p:sldId id="411" r:id="rId22"/>
+    <p:sldId id="421" r:id="rId18"/>
+    <p:sldId id="422" r:id="rId19"/>
+    <p:sldId id="423" r:id="rId20"/>
+    <p:sldId id="393" r:id="rId21"/>
   </p:sldIdLst>
   <p:sldSz cx="12188825" cy="6858000"/>
   <p:notesSz cx="7010400" cy="9296400"/>
@@ -278,7 +277,7 @@
           <a:p>
             <a:fld id="{0B842F42-2CE9-4E35-95C1-410DC08A50B1}" type="datetimeFigureOut">
               <a:rPr lang="en-US" smtClean="0"/>
-              <a:t>1/29/20</a:t>
+              <a:t>2/3/20</a:t>
             </a:fld>
             <a:endParaRPr lang="en-US"/>
           </a:p>
@@ -443,7 +442,7 @@
           <a:p>
             <a:fld id="{6F282904-F315-4730-8D91-37D99E141A6F}" type="datetimeFigureOut">
               <a:rPr lang="en-US" smtClean="0"/>
-              <a:t>1/29/20</a:t>
+              <a:t>2/3/20</a:t>
             </a:fld>
             <a:endParaRPr lang="en-US"/>
           </a:p>
@@ -5490,12 +5489,18 @@
       </p:grpSpPr>
       <p:sp>
         <p:nvSpPr>
-          <p:cNvPr id="4" name="Title 3"/>
+          <p:cNvPr id="2" name="Title 1">
+            <a:extLst>
+              <a:ext uri="{FF2B5EF4-FFF2-40B4-BE49-F238E27FC236}">
+                <a16:creationId xmlns:a16="http://schemas.microsoft.com/office/drawing/2014/main" id="{9DAD2857-ED5C-3349-9618-38C05BAFC818}"/>
+              </a:ext>
+            </a:extLst>
+          </p:cNvPr>
           <p:cNvSpPr>
             <a:spLocks noGrp="1"/>
           </p:cNvSpPr>
           <p:nvPr>
-            <p:ph type="ctrTitle"/>
+            <p:ph type="title"/>
           </p:nvPr>
         </p:nvSpPr>
         <p:spPr/>
@@ -5505,111 +5510,88 @@
           <a:p>
             <a:r>
               <a:rPr lang="en-US" dirty="0"/>
-              <a:t>Acknowledgments</a:t>
-            </a:r>
-            <a:endParaRPr lang="en-US" i="1" dirty="0"/>
+              <a:t>UQ functionality</a:t>
+            </a:r>
           </a:p>
         </p:txBody>
       </p:sp>
       <p:sp>
         <p:nvSpPr>
-          <p:cNvPr id="5" name="Subtitle 4"/>
+          <p:cNvPr id="3" name="Content Placeholder 2">
+            <a:extLst>
+              <a:ext uri="{FF2B5EF4-FFF2-40B4-BE49-F238E27FC236}">
+                <a16:creationId xmlns:a16="http://schemas.microsoft.com/office/drawing/2014/main" id="{68AAB3DD-2C60-3B42-BE3C-BEC4424B9261}"/>
+              </a:ext>
+            </a:extLst>
+          </p:cNvPr>
           <p:cNvSpPr>
             <a:spLocks noGrp="1"/>
           </p:cNvSpPr>
           <p:nvPr>
-            <p:ph type="subTitle" idx="1"/>
+            <p:ph idx="1"/>
           </p:nvPr>
         </p:nvSpPr>
-        <p:spPr>
-          <a:xfrm>
-            <a:off x="901357" y="1186533"/>
-            <a:ext cx="10178845" cy="1718856"/>
-          </a:xfrm>
-        </p:spPr>
+        <p:spPr/>
         <p:txBody>
           <a:bodyPr/>
           <a:lstStyle/>
           <a:p>
             <a:r>
-              <a:rPr lang="en-US" i="1" dirty="0"/>
-              <a:t>This research was supported by the </a:t>
-            </a:r>
-            <a:r>
-              <a:rPr lang="en-US" i="1" dirty="0" err="1"/>
-              <a:t>Exascale</a:t>
-            </a:r>
-            <a:r>
-              <a:rPr lang="en-US" i="1" dirty="0"/>
-              <a:t> Computing Project (ECP), Project Number: 17-SC-20-SC, a collaborative effort of two DOE organizations - the Office of Science and the National Nuclear Security Administration, responsible for the planning and preparation of a capable </a:t>
-            </a:r>
-            <a:r>
-              <a:rPr lang="en-US" i="1" dirty="0" err="1"/>
-              <a:t>exascale</a:t>
-            </a:r>
-            <a:r>
-              <a:rPr lang="en-US" i="1" dirty="0"/>
-              <a:t> ecosystem, including software, applications, hardware, advanced system engineering and early testbed platforms, to support the nation's </a:t>
-            </a:r>
-            <a:r>
-              <a:rPr lang="en-US" i="1" dirty="0" err="1"/>
-              <a:t>exascale</a:t>
-            </a:r>
-            <a:r>
-              <a:rPr lang="en-US" i="1" dirty="0"/>
-              <a:t> computing imperative.</a:t>
-            </a:r>
+              <a:rPr lang="en-US" dirty="0"/>
+              <a:t>Cross-validation</a:t>
+            </a:r>
+          </a:p>
+          <a:p>
+            <a:pPr lvl="1"/>
+            <a:r>
+              <a:rPr lang="en-US" dirty="0"/>
+              <a:t>Generate repeatable partitions of training, validation and testing sets </a:t>
+            </a:r>
+          </a:p>
+          <a:p>
+            <a:pPr lvl="1"/>
+            <a:r>
+              <a:rPr lang="en-US" dirty="0"/>
+              <a:t>Fraction, block and individual data specification possible </a:t>
+            </a:r>
+          </a:p>
+          <a:p>
+            <a:r>
+              <a:rPr lang="en-US" dirty="0"/>
+              <a:t>Leave-one-out cross-validation (LOOCV)</a:t>
+            </a:r>
+          </a:p>
+          <a:p>
+            <a:pPr lvl="1"/>
+            <a:r>
+              <a:rPr lang="en-US" dirty="0"/>
+              <a:t>Extreme case of k-fold cross validation for large number of labels</a:t>
+            </a:r>
+          </a:p>
+          <a:p>
+            <a:pPr lvl="1"/>
+            <a:r>
+              <a:rPr lang="en-US" dirty="0"/>
+              <a:t>Iterative refinement of data sets to identify outliers</a:t>
+            </a:r>
+          </a:p>
+          <a:p>
+            <a:pPr lvl="1"/>
+            <a:r>
+              <a:rPr lang="en-US" dirty="0"/>
+              <a:t>See Data Analysis Workflow example later</a:t>
+            </a:r>
+          </a:p>
+          <a:p>
+            <a:pPr lvl="1"/>
             <a:endParaRPr lang="en-US" dirty="0"/>
-          </a:p>
-        </p:txBody>
-      </p:sp>
-      <p:sp>
-        <p:nvSpPr>
-          <p:cNvPr id="3" name="Rectangle 2"/>
-          <p:cNvSpPr/>
-          <p:nvPr/>
-        </p:nvSpPr>
-        <p:spPr>
-          <a:xfrm>
-            <a:off x="8584134" y="6095144"/>
-            <a:ext cx="2496068" cy="313932"/>
-          </a:xfrm>
-          <a:prstGeom prst="rect">
-            <a:avLst/>
-          </a:prstGeom>
-        </p:spPr>
-        <p:txBody>
-          <a:bodyPr wrap="none">
-            <a:spAutoFit/>
-          </a:bodyPr>
-          <a:lstStyle/>
-          <a:p>
-            <a:pPr algn="ctr">
-              <a:lnSpc>
-                <a:spcPct val="90000"/>
-              </a:lnSpc>
-            </a:pPr>
-            <a:r>
-              <a:rPr lang="en-US" sz="1600" dirty="0">
-                <a:solidFill>
-                  <a:schemeClr val="accent4"/>
-                </a:solidFill>
-                <a:hlinkClick r:id="rId2"/>
-              </a:rPr>
-              <a:t>www.ExascaleProject.org</a:t>
-            </a:r>
-            <a:endParaRPr lang="en-US" sz="1600" dirty="0">
-              <a:solidFill>
-                <a:schemeClr val="accent4"/>
-              </a:solidFill>
-            </a:endParaRPr>
           </a:p>
         </p:txBody>
       </p:sp>
     </p:spTree>
     <p:extLst>
       <p:ext uri="{BB962C8B-B14F-4D97-AF65-F5344CB8AC3E}">
-        <p14:creationId xmlns:p14="http://schemas.microsoft.com/office/powerpoint/2010/main" val="1264112038"/>
+        <p14:creationId xmlns:p14="http://schemas.microsoft.com/office/powerpoint/2010/main" val="1225549467"/>
       </p:ext>
     </p:extLst>
   </p:cSld>
@@ -5641,7 +5623,7 @@
           <p:cNvPr id="2" name="Title 1">
             <a:extLst>
               <a:ext uri="{FF2B5EF4-FFF2-40B4-BE49-F238E27FC236}">
-                <a16:creationId xmlns:a16="http://schemas.microsoft.com/office/drawing/2014/main" id="{3A9E6EF8-BC98-A74F-9BEB-2C3A6C3170E3}"/>
+                <a16:creationId xmlns:a16="http://schemas.microsoft.com/office/drawing/2014/main" id="{A8FF2806-C05F-AA42-B760-C692D9BEF376}"/>
               </a:ext>
             </a:extLst>
           </p:cNvPr>
@@ -5659,7 +5641,7 @@
           <a:p>
             <a:r>
               <a:rPr lang="en-US" dirty="0"/>
-              <a:t>Backup Slides</a:t>
+              <a:t>UQ functionality (in development)</a:t>
             </a:r>
           </a:p>
         </p:txBody>
@@ -5669,7 +5651,7 @@
           <p:cNvPr id="3" name="Content Placeholder 2">
             <a:extLst>
               <a:ext uri="{FF2B5EF4-FFF2-40B4-BE49-F238E27FC236}">
-                <a16:creationId xmlns:a16="http://schemas.microsoft.com/office/drawing/2014/main" id="{1FEEE0B5-BF1D-8E46-B6BA-D88DDDB7F7C0}"/>
+                <a16:creationId xmlns:a16="http://schemas.microsoft.com/office/drawing/2014/main" id="{3158B22C-A4AB-9E4F-8BF6-EFB1B1EFE948}"/>
               </a:ext>
             </a:extLst>
           </p:cNvPr>
@@ -5685,6 +5667,81 @@
           <a:bodyPr/>
           <a:lstStyle/>
           <a:p>
+            <a:r>
+              <a:rPr lang="en-US" dirty="0"/>
+              <a:t>Data </a:t>
+            </a:r>
+            <a:r>
+              <a:rPr lang="en-US" dirty="0" err="1"/>
+              <a:t>subsetting</a:t>
+            </a:r>
+            <a:endParaRPr lang="en-US" dirty="0"/>
+          </a:p>
+          <a:p>
+            <a:pPr lvl="1"/>
+            <a:r>
+              <a:rPr lang="en-US" dirty="0">
+                <a:cs typeface="Arial Narrow"/>
+              </a:rPr>
+              <a:t>Data normalization and batch effect removal </a:t>
+            </a:r>
+          </a:p>
+          <a:p>
+            <a:pPr lvl="1"/>
+            <a:r>
+              <a:rPr lang="en-US" dirty="0">
+                <a:cs typeface="Arial Narrow"/>
+              </a:rPr>
+              <a:t>Improve data quality for subsequent analysis</a:t>
+            </a:r>
+          </a:p>
+          <a:p>
+            <a:r>
+              <a:rPr lang="en-US" dirty="0"/>
+              <a:t>Feature selection</a:t>
+            </a:r>
+            <a:endParaRPr lang="en-US" dirty="0">
+              <a:cs typeface="Arial Narrow"/>
+            </a:endParaRPr>
+          </a:p>
+          <a:p>
+            <a:pPr lvl="1"/>
+            <a:r>
+              <a:rPr lang="en-US" dirty="0">
+                <a:cs typeface="Arial Narrow"/>
+              </a:rPr>
+              <a:t>identifies a subset of features that are predictive, decorrelated, and generalizable</a:t>
+            </a:r>
+          </a:p>
+          <a:p>
+            <a:pPr lvl="1"/>
+            <a:r>
+              <a:rPr lang="en-US" dirty="0">
+                <a:cs typeface="Arial Narrow"/>
+              </a:rPr>
+              <a:t>reduce model complexity</a:t>
+            </a:r>
+          </a:p>
+          <a:p>
+            <a:pPr lvl="1"/>
+            <a:r>
+              <a:rPr lang="en-US" dirty="0">
+                <a:cs typeface="Arial Narrow"/>
+              </a:rPr>
+              <a:t>increase model training speed</a:t>
+            </a:r>
+          </a:p>
+          <a:p>
+            <a:pPr lvl="1"/>
+            <a:r>
+              <a:rPr lang="en-US" dirty="0">
+                <a:cs typeface="Arial Narrow"/>
+              </a:rPr>
+              <a:t>improve prediction performance</a:t>
+            </a:r>
+            <a:endParaRPr lang="en-US" dirty="0"/>
+          </a:p>
+          <a:p>
             <a:endParaRPr lang="en-US" dirty="0"/>
           </a:p>
         </p:txBody>
@@ -5692,7 +5749,7 @@
     </p:spTree>
     <p:extLst>
       <p:ext uri="{BB962C8B-B14F-4D97-AF65-F5344CB8AC3E}">
-        <p14:creationId xmlns:p14="http://schemas.microsoft.com/office/powerpoint/2010/main" val="668075500"/>
+        <p14:creationId xmlns:p14="http://schemas.microsoft.com/office/powerpoint/2010/main" val="1787587411"/>
       </p:ext>
     </p:extLst>
   </p:cSld>
@@ -5724,7 +5781,7 @@
           <p:cNvPr id="2" name="Title 1">
             <a:extLst>
               <a:ext uri="{FF2B5EF4-FFF2-40B4-BE49-F238E27FC236}">
-                <a16:creationId xmlns:a16="http://schemas.microsoft.com/office/drawing/2014/main" id="{9AC09FDD-3CF8-3245-BB00-C351D23D85BD}"/>
+                <a16:creationId xmlns:a16="http://schemas.microsoft.com/office/drawing/2014/main" id="{41125FB1-2D0F-2048-A757-0A6C8A4B3D2C}"/>
               </a:ext>
             </a:extLst>
           </p:cNvPr>
@@ -5742,7 +5799,7 @@
           <a:p>
             <a:r>
               <a:rPr lang="en-US" dirty="0"/>
-              <a:t>Example Benchmark Workflow</a:t>
+              <a:t>RL Support (in development)</a:t>
             </a:r>
           </a:p>
         </p:txBody>
@@ -5752,7 +5809,7 @@
           <p:cNvPr id="3" name="Content Placeholder 2">
             <a:extLst>
               <a:ext uri="{FF2B5EF4-FFF2-40B4-BE49-F238E27FC236}">
-                <a16:creationId xmlns:a16="http://schemas.microsoft.com/office/drawing/2014/main" id="{2450FE25-9797-FB4D-AFE7-97E96E8006A6}"/>
+                <a16:creationId xmlns:a16="http://schemas.microsoft.com/office/drawing/2014/main" id="{19507A04-B041-6E4F-BB2F-354C037C42C0}"/>
               </a:ext>
             </a:extLst>
           </p:cNvPr>
@@ -5769,165 +5826,63 @@
           <a:lstStyle/>
           <a:p>
             <a:r>
-              <a:rPr lang="en-US" sz="2400" dirty="0" err="1">
-                <a:latin typeface="Consolas" panose="020B0609020204030204" pitchFamily="49" charset="0"/>
-                <a:cs typeface="Consolas" panose="020B0609020204030204" pitchFamily="49" charset="0"/>
-              </a:rPr>
-              <a:t>finalize_parameters</a:t>
-            </a:r>
-            <a:r>
-              <a:rPr lang="en-US" dirty="0"/>
-              <a:t>: </a:t>
+              <a:rPr lang="en-US" dirty="0"/>
+              <a:t>CANDLE-RL library module</a:t>
             </a:r>
           </a:p>
           <a:p>
             <a:pPr lvl="1"/>
             <a:r>
               <a:rPr lang="en-US" dirty="0"/>
-              <a:t>Read default values for the model from </a:t>
-            </a:r>
-            <a:r>
-              <a:rPr lang="en-US" dirty="0" err="1">
-                <a:latin typeface="Consolas" panose="020B0609020204030204" pitchFamily="49" charset="0"/>
-                <a:cs typeface="Consolas" panose="020B0609020204030204" pitchFamily="49" charset="0"/>
-              </a:rPr>
-              <a:t>default_model.txt</a:t>
-            </a:r>
-            <a:r>
-              <a:rPr lang="en-US" dirty="0">
-                <a:latin typeface="Consolas" panose="020B0609020204030204" pitchFamily="49" charset="0"/>
-                <a:cs typeface="Consolas" panose="020B0609020204030204" pitchFamily="49" charset="0"/>
-              </a:rPr>
-              <a:t> </a:t>
-            </a:r>
-            <a:r>
-              <a:rPr lang="en-US" dirty="0"/>
-              <a:t>file</a:t>
+              <a:t>Additional default keywords for RL networks</a:t>
+            </a:r>
+          </a:p>
+          <a:p>
+            <a:r>
+              <a:rPr lang="en-US" dirty="0"/>
+              <a:t>Additions at Supervisor level</a:t>
             </a:r>
           </a:p>
           <a:p>
             <a:pPr lvl="1"/>
             <a:r>
               <a:rPr lang="en-US" dirty="0"/>
-              <a:t>Automatically parse many standard ML hyperparameters</a:t>
-            </a:r>
-          </a:p>
-          <a:p>
-            <a:pPr lvl="2"/>
-            <a:r>
-              <a:rPr lang="en-US" dirty="0" err="1">
-                <a:latin typeface="Consolas" panose="020B0609020204030204" pitchFamily="49" charset="0"/>
-                <a:cs typeface="Consolas" panose="020B0609020204030204" pitchFamily="49" charset="0"/>
-              </a:rPr>
-              <a:t>learning_rate</a:t>
-            </a:r>
-            <a:r>
-              <a:rPr lang="en-US" dirty="0">
-                <a:latin typeface="Andale Mono" panose="020B0509000000000004" pitchFamily="49" charset="0"/>
-              </a:rPr>
-              <a:t>, </a:t>
-            </a:r>
-            <a:r>
-              <a:rPr lang="en-US" dirty="0" err="1">
-                <a:latin typeface="Consolas" panose="020B0609020204030204" pitchFamily="49" charset="0"/>
-                <a:cs typeface="Consolas" panose="020B0609020204030204" pitchFamily="49" charset="0"/>
-              </a:rPr>
-              <a:t>batch_size</a:t>
-            </a:r>
-            <a:r>
-              <a:rPr lang="en-US" dirty="0">
-                <a:latin typeface="Andale Mono" panose="020B0509000000000004" pitchFamily="49" charset="0"/>
-              </a:rPr>
-              <a:t>, </a:t>
-            </a:r>
-            <a:r>
-              <a:rPr lang="en-US" dirty="0" err="1">
-                <a:latin typeface="+mn-lt"/>
-              </a:rPr>
-              <a:t>etc</a:t>
-            </a:r>
-            <a:endParaRPr lang="en-US" dirty="0">
-              <a:latin typeface="+mn-lt"/>
-            </a:endParaRPr>
-          </a:p>
-          <a:p>
-            <a:pPr lvl="2"/>
-            <a:r>
-              <a:rPr lang="en-US" dirty="0" err="1">
-                <a:latin typeface="Consolas" panose="020B0609020204030204" pitchFamily="49" charset="0"/>
-                <a:cs typeface="Consolas" panose="020B0609020204030204" pitchFamily="49" charset="0"/>
-              </a:rPr>
-              <a:t>data_url</a:t>
-            </a:r>
-            <a:r>
-              <a:rPr lang="en-US" dirty="0">
-                <a:latin typeface="Andale Mono" panose="020B0509000000000004" pitchFamily="49" charset="0"/>
-              </a:rPr>
-              <a:t>, </a:t>
-            </a:r>
-            <a:r>
-              <a:rPr lang="en-US" dirty="0" err="1">
-                <a:latin typeface="Consolas" panose="020B0609020204030204" pitchFamily="49" charset="0"/>
-                <a:cs typeface="Consolas" panose="020B0609020204030204" pitchFamily="49" charset="0"/>
-              </a:rPr>
-              <a:t>train_data</a:t>
-            </a:r>
-            <a:r>
-              <a:rPr lang="en-US" dirty="0">
-                <a:latin typeface="Andale Mono" panose="020B0509000000000004" pitchFamily="49" charset="0"/>
-              </a:rPr>
-              <a:t>, </a:t>
-            </a:r>
-            <a:r>
-              <a:rPr lang="en-US" dirty="0" err="1">
-                <a:latin typeface="Consolas" panose="020B0609020204030204" pitchFamily="49" charset="0"/>
-                <a:cs typeface="Consolas" panose="020B0609020204030204" pitchFamily="49" charset="0"/>
-              </a:rPr>
-              <a:t>test_data</a:t>
-            </a:r>
-            <a:r>
-              <a:rPr lang="en-US" dirty="0"/>
-              <a:t>…</a:t>
-            </a:r>
+              <a:t>Support for more </a:t>
+            </a:r>
+            <a:r>
+              <a:rPr lang="en-US"/>
+              <a:t>complex workflows</a:t>
+            </a:r>
+            <a:endParaRPr lang="en-US" dirty="0"/>
           </a:p>
           <a:p>
             <a:pPr lvl="1"/>
             <a:r>
               <a:rPr lang="en-US" dirty="0"/>
-              <a:t>Allows user to add other keywords via </a:t>
-            </a:r>
-            <a:r>
-              <a:rPr lang="en-US" dirty="0" err="1">
-                <a:latin typeface="Consolas" panose="020B0609020204030204" pitchFamily="49" charset="0"/>
-                <a:cs typeface="Consolas" panose="020B0609020204030204" pitchFamily="49" charset="0"/>
-              </a:rPr>
-              <a:t>additional_definitions</a:t>
-            </a:r>
-            <a:endParaRPr lang="en-US" sz="2000" dirty="0">
-              <a:latin typeface="Consolas" panose="020B0609020204030204" pitchFamily="49" charset="0"/>
-              <a:cs typeface="Consolas" panose="020B0609020204030204" pitchFamily="49" charset="0"/>
-            </a:endParaRPr>
+              <a:t>Multiple agents/learners with integrated environments (simulation)</a:t>
+            </a:r>
           </a:p>
           <a:p>
             <a:pPr lvl="1"/>
             <a:r>
               <a:rPr lang="en-US" dirty="0"/>
-              <a:t>Sets undefined hyperparameters to the corresponding Keras defaults to ensure consistency across backend frameworks </a:t>
-            </a:r>
-          </a:p>
-          <a:p>
-            <a:pPr lvl="2"/>
-            <a:r>
-              <a:rPr lang="en-US" dirty="0"/>
-              <a:t>Early work revealed some performance differences were due to mismatched default settings</a:t>
-            </a:r>
+              <a:t>May be distributed across a variety of resources</a:t>
+            </a:r>
+          </a:p>
+          <a:p>
+            <a:pPr lvl="1"/>
+            <a:endParaRPr lang="en-US" dirty="0"/>
+          </a:p>
+          <a:p>
+            <a:pPr lvl="1"/>
+            <a:endParaRPr lang="en-US" dirty="0"/>
           </a:p>
         </p:txBody>
       </p:sp>
     </p:spTree>
     <p:extLst>
       <p:ext uri="{BB962C8B-B14F-4D97-AF65-F5344CB8AC3E}">
-        <p14:creationId xmlns:p14="http://schemas.microsoft.com/office/powerpoint/2010/main" val="2728653225"/>
+        <p14:creationId xmlns:p14="http://schemas.microsoft.com/office/powerpoint/2010/main" val="1338380729"/>
       </p:ext>
     </p:extLst>
   </p:cSld>
@@ -5956,18 +5911,12 @@
       </p:grpSpPr>
       <p:sp>
         <p:nvSpPr>
-          <p:cNvPr id="2" name="Title 1">
-            <a:extLst>
-              <a:ext uri="{FF2B5EF4-FFF2-40B4-BE49-F238E27FC236}">
-                <a16:creationId xmlns:a16="http://schemas.microsoft.com/office/drawing/2014/main" id="{52A58DFA-CE74-5540-980F-6E7FC78E3B9E}"/>
-              </a:ext>
-            </a:extLst>
-          </p:cNvPr>
+          <p:cNvPr id="4" name="Title 3"/>
           <p:cNvSpPr>
             <a:spLocks noGrp="1"/>
           </p:cNvSpPr>
           <p:nvPr>
-            <p:ph type="title"/>
+            <p:ph type="ctrTitle"/>
           </p:nvPr>
         </p:nvSpPr>
         <p:spPr/>
@@ -5977,429 +5926,111 @@
           <a:p>
             <a:r>
               <a:rPr lang="en-US" dirty="0"/>
-              <a:t>Example Benchmark Workflow</a:t>
-            </a:r>
+              <a:t>Acknowledgments</a:t>
+            </a:r>
+            <a:endParaRPr lang="en-US" i="1" dirty="0"/>
           </a:p>
         </p:txBody>
       </p:sp>
       <p:sp>
         <p:nvSpPr>
-          <p:cNvPr id="3" name="Content Placeholder 2">
-            <a:extLst>
-              <a:ext uri="{FF2B5EF4-FFF2-40B4-BE49-F238E27FC236}">
-                <a16:creationId xmlns:a16="http://schemas.microsoft.com/office/drawing/2014/main" id="{B855B05B-C6D2-0C48-9A00-05005A6B3629}"/>
-              </a:ext>
-            </a:extLst>
-          </p:cNvPr>
+          <p:cNvPr id="5" name="Subtitle 4"/>
           <p:cNvSpPr>
             <a:spLocks noGrp="1"/>
           </p:cNvSpPr>
           <p:nvPr>
-            <p:ph idx="1"/>
+            <p:ph type="subTitle" idx="1"/>
           </p:nvPr>
         </p:nvSpPr>
-        <p:spPr/>
+        <p:spPr>
+          <a:xfrm>
+            <a:off x="901357" y="1186533"/>
+            <a:ext cx="10178845" cy="1718856"/>
+          </a:xfrm>
+        </p:spPr>
         <p:txBody>
           <a:bodyPr/>
           <a:lstStyle/>
           <a:p>
             <a:r>
-              <a:rPr lang="en-US" dirty="0">
-                <a:latin typeface="Consolas" panose="020B0609020204030204" pitchFamily="49" charset="0"/>
-                <a:cs typeface="Consolas" panose="020B0609020204030204" pitchFamily="49" charset="0"/>
-              </a:rPr>
-              <a:t>Data management</a:t>
-            </a:r>
-          </a:p>
-          <a:p>
-            <a:pPr lvl="1"/>
-            <a:r>
-              <a:rPr lang="en-US" dirty="0" err="1">
-                <a:latin typeface="Consolas" panose="020B0609020204030204" pitchFamily="49" charset="0"/>
-                <a:cs typeface="Consolas" panose="020B0609020204030204" pitchFamily="49" charset="0"/>
-              </a:rPr>
-              <a:t>fetch_data</a:t>
-            </a:r>
-            <a:endParaRPr lang="en-US" dirty="0">
-              <a:latin typeface="Consolas" panose="020B0609020204030204" pitchFamily="49" charset="0"/>
-              <a:cs typeface="Consolas" panose="020B0609020204030204" pitchFamily="49" charset="0"/>
+              <a:rPr lang="en-US" i="1" dirty="0"/>
+              <a:t>This research was supported by the </a:t>
+            </a:r>
+            <a:r>
+              <a:rPr lang="en-US" i="1" dirty="0" err="1"/>
+              <a:t>Exascale</a:t>
+            </a:r>
+            <a:r>
+              <a:rPr lang="en-US" i="1" dirty="0"/>
+              <a:t> Computing Project (ECP), Project Number: 17-SC-20-SC, a collaborative effort of two DOE organizations - the Office of Science and the National Nuclear Security Administration, responsible for the planning and preparation of a capable </a:t>
+            </a:r>
+            <a:r>
+              <a:rPr lang="en-US" i="1" dirty="0" err="1"/>
+              <a:t>exascale</a:t>
+            </a:r>
+            <a:r>
+              <a:rPr lang="en-US" i="1" dirty="0"/>
+              <a:t> ecosystem, including software, applications, hardware, advanced system engineering and early testbed platforms, to support the nation's </a:t>
+            </a:r>
+            <a:r>
+              <a:rPr lang="en-US" i="1" dirty="0" err="1"/>
+              <a:t>exascale</a:t>
+            </a:r>
+            <a:r>
+              <a:rPr lang="en-US" i="1" dirty="0"/>
+              <a:t> computing imperative.</a:t>
+            </a:r>
+            <a:endParaRPr lang="en-US" dirty="0"/>
+          </a:p>
+        </p:txBody>
+      </p:sp>
+      <p:sp>
+        <p:nvSpPr>
+          <p:cNvPr id="3" name="Rectangle 2"/>
+          <p:cNvSpPr/>
+          <p:nvPr/>
+        </p:nvSpPr>
+        <p:spPr>
+          <a:xfrm>
+            <a:off x="8584134" y="6095144"/>
+            <a:ext cx="2496068" cy="313932"/>
+          </a:xfrm>
+          <a:prstGeom prst="rect">
+            <a:avLst/>
+          </a:prstGeom>
+        </p:spPr>
+        <p:txBody>
+          <a:bodyPr wrap="none">
+            <a:spAutoFit/>
+          </a:bodyPr>
+          <a:lstStyle/>
+          <a:p>
+            <a:pPr algn="ctr">
+              <a:lnSpc>
+                <a:spcPct val="90000"/>
+              </a:lnSpc>
+            </a:pPr>
+            <a:r>
+              <a:rPr lang="en-US" sz="1600" dirty="0">
+                <a:solidFill>
+                  <a:schemeClr val="accent4"/>
+                </a:solidFill>
+                <a:hlinkClick r:id="rId2"/>
+              </a:rPr>
+              <a:t>www.ExascaleProject.org</a:t>
+            </a:r>
+            <a:endParaRPr lang="en-US" sz="1600" dirty="0">
+              <a:solidFill>
+                <a:schemeClr val="accent4"/>
+              </a:solidFill>
             </a:endParaRPr>
-          </a:p>
-          <a:p>
-            <a:pPr lvl="2"/>
-            <a:r>
-              <a:rPr lang="en-US" dirty="0"/>
-              <a:t>Check if local data copy exists; if not, fetch data from </a:t>
-            </a:r>
-            <a:r>
-              <a:rPr lang="en-US" dirty="0" err="1">
-                <a:latin typeface="Consolas" panose="020B0609020204030204" pitchFamily="49" charset="0"/>
-                <a:cs typeface="Consolas" panose="020B0609020204030204" pitchFamily="49" charset="0"/>
-              </a:rPr>
-              <a:t>data_url</a:t>
-            </a:r>
-            <a:r>
-              <a:rPr lang="en-US" dirty="0">
-                <a:latin typeface="Consolas" panose="020B0609020204030204" pitchFamily="49" charset="0"/>
-                <a:cs typeface="Consolas" panose="020B0609020204030204" pitchFamily="49" charset="0"/>
-              </a:rPr>
-              <a:t> </a:t>
-            </a:r>
-          </a:p>
-          <a:p>
-            <a:pPr lvl="2"/>
-            <a:r>
-              <a:rPr lang="en-US" dirty="0"/>
-              <a:t>allows separate </a:t>
-            </a:r>
-            <a:r>
-              <a:rPr lang="en-US" dirty="0" err="1">
-                <a:latin typeface="Consolas" panose="020B0609020204030204" pitchFamily="49" charset="0"/>
-                <a:cs typeface="Consolas" panose="020B0609020204030204" pitchFamily="49" charset="0"/>
-              </a:rPr>
-              <a:t>train_data</a:t>
-            </a:r>
-            <a:r>
-              <a:rPr lang="en-US" dirty="0">
-                <a:latin typeface="Consolas" panose="020B0609020204030204" pitchFamily="49" charset="0"/>
-                <a:cs typeface="Consolas" panose="020B0609020204030204" pitchFamily="49" charset="0"/>
-              </a:rPr>
-              <a:t> </a:t>
-            </a:r>
-            <a:r>
-              <a:rPr lang="en-US" dirty="0"/>
-              <a:t>and </a:t>
-            </a:r>
-            <a:r>
-              <a:rPr lang="en-US" dirty="0" err="1">
-                <a:latin typeface="Consolas" panose="020B0609020204030204" pitchFamily="49" charset="0"/>
-                <a:cs typeface="Consolas" panose="020B0609020204030204" pitchFamily="49" charset="0"/>
-              </a:rPr>
-              <a:t>test_data</a:t>
-            </a:r>
-            <a:r>
-              <a:rPr lang="en-US" dirty="0">
-                <a:latin typeface="Consolas" panose="020B0609020204030204" pitchFamily="49" charset="0"/>
-                <a:cs typeface="Consolas" panose="020B0609020204030204" pitchFamily="49" charset="0"/>
-              </a:rPr>
-              <a:t> </a:t>
-            </a:r>
-            <a:r>
-              <a:rPr lang="en-US" dirty="0"/>
-              <a:t>files, check MD5 hash if provided, </a:t>
-            </a:r>
-            <a:r>
-              <a:rPr lang="en-US" dirty="0" err="1"/>
-              <a:t>untar</a:t>
-            </a:r>
-            <a:r>
-              <a:rPr lang="en-US" dirty="0"/>
-              <a:t> if needed</a:t>
-            </a:r>
-          </a:p>
-          <a:p>
-            <a:pPr lvl="1"/>
-            <a:r>
-              <a:rPr lang="en-US" dirty="0" err="1">
-                <a:latin typeface="Consolas" panose="020B0609020204030204" pitchFamily="49" charset="0"/>
-                <a:cs typeface="Consolas" panose="020B0609020204030204" pitchFamily="49" charset="0"/>
-              </a:rPr>
-              <a:t>load_data</a:t>
-            </a:r>
-            <a:r>
-              <a:rPr lang="en-US" dirty="0">
-                <a:latin typeface="Consolas" panose="020B0609020204030204" pitchFamily="49" charset="0"/>
-                <a:cs typeface="Consolas" panose="020B0609020204030204" pitchFamily="49" charset="0"/>
-              </a:rPr>
-              <a:t> </a:t>
-            </a:r>
-          </a:p>
-          <a:p>
-            <a:pPr lvl="2"/>
-            <a:r>
-              <a:rPr lang="en-US" dirty="0"/>
-              <a:t>Load labeled (</a:t>
-            </a:r>
-            <a:r>
-              <a:rPr lang="en-US" dirty="0" err="1"/>
-              <a:t>xy</a:t>
-            </a:r>
-            <a:r>
-              <a:rPr lang="en-US" dirty="0"/>
-              <a:t>) or unlabeled (x) data, perform various manipulations </a:t>
-            </a:r>
-          </a:p>
-          <a:p>
-            <a:pPr lvl="3"/>
-            <a:r>
-              <a:rPr lang="en-US" dirty="0"/>
-              <a:t>Shuffle, scale, split into </a:t>
-            </a:r>
-            <a:r>
-              <a:rPr lang="en-US" dirty="0">
-                <a:latin typeface="Consolas" panose="020B0609020204030204" pitchFamily="49" charset="0"/>
-                <a:cs typeface="Consolas" panose="020B0609020204030204" pitchFamily="49" charset="0"/>
-              </a:rPr>
-              <a:t>{train, validation, test}</a:t>
-            </a:r>
-          </a:p>
-          <a:p>
-            <a:pPr lvl="3"/>
-            <a:r>
-              <a:rPr lang="en-US" dirty="0"/>
-              <a:t>Takes UQ operations to provide repeatable cross-validation data splits</a:t>
-            </a:r>
-          </a:p>
-          <a:p>
-            <a:pPr lvl="2"/>
-            <a:endParaRPr lang="en-US" dirty="0"/>
-          </a:p>
-          <a:p>
-            <a:pPr marL="0" indent="-49212">
-              <a:buNone/>
-            </a:pPr>
-            <a:endParaRPr lang="en-US" dirty="0"/>
           </a:p>
         </p:txBody>
       </p:sp>
     </p:spTree>
     <p:extLst>
       <p:ext uri="{BB962C8B-B14F-4D97-AF65-F5344CB8AC3E}">
-        <p14:creationId xmlns:p14="http://schemas.microsoft.com/office/powerpoint/2010/main" val="962392393"/>
-      </p:ext>
-    </p:extLst>
-  </p:cSld>
-  <p:clrMapOvr>
-    <a:masterClrMapping/>
-  </p:clrMapOvr>
-</p:sld>
-</file>
-
-<file path=ppt/slides/slide18.xml><?xml version="1.0" encoding="utf-8"?>
-<p:sld xmlns:a="http://schemas.openxmlformats.org/drawingml/2006/main" xmlns:r="http://schemas.openxmlformats.org/officeDocument/2006/relationships" xmlns:p="http://schemas.openxmlformats.org/presentationml/2006/main">
-  <p:cSld>
-    <p:spTree>
-      <p:nvGrpSpPr>
-        <p:cNvPr id="1" name=""/>
-        <p:cNvGrpSpPr/>
-        <p:nvPr/>
-      </p:nvGrpSpPr>
-      <p:grpSpPr>
-        <a:xfrm>
-          <a:off x="0" y="0"/>
-          <a:ext cx="0" cy="0"/>
-          <a:chOff x="0" y="0"/>
-          <a:chExt cx="0" cy="0"/>
-        </a:xfrm>
-      </p:grpSpPr>
-      <p:sp>
-        <p:nvSpPr>
-          <p:cNvPr id="2" name="Title 1">
-            <a:extLst>
-              <a:ext uri="{FF2B5EF4-FFF2-40B4-BE49-F238E27FC236}">
-                <a16:creationId xmlns:a16="http://schemas.microsoft.com/office/drawing/2014/main" id="{841738B7-7454-FB42-923C-1A2197322EEE}"/>
-              </a:ext>
-            </a:extLst>
-          </p:cNvPr>
-          <p:cNvSpPr>
-            <a:spLocks noGrp="1"/>
-          </p:cNvSpPr>
-          <p:nvPr>
-            <p:ph type="title"/>
-          </p:nvPr>
-        </p:nvSpPr>
-        <p:spPr/>
-        <p:txBody>
-          <a:bodyPr/>
-          <a:lstStyle/>
-          <a:p>
-            <a:r>
-              <a:rPr lang="en-US" dirty="0"/>
-              <a:t>Example Benchmark Workflow</a:t>
-            </a:r>
-          </a:p>
-        </p:txBody>
-      </p:sp>
-      <p:sp>
-        <p:nvSpPr>
-          <p:cNvPr id="3" name="Content Placeholder 2">
-            <a:extLst>
-              <a:ext uri="{FF2B5EF4-FFF2-40B4-BE49-F238E27FC236}">
-                <a16:creationId xmlns:a16="http://schemas.microsoft.com/office/drawing/2014/main" id="{F935B2C4-D35D-0F4A-A4F0-442A2BA6813E}"/>
-              </a:ext>
-            </a:extLst>
-          </p:cNvPr>
-          <p:cNvSpPr>
-            <a:spLocks noGrp="1"/>
-          </p:cNvSpPr>
-          <p:nvPr>
-            <p:ph idx="1"/>
-          </p:nvPr>
-        </p:nvSpPr>
-        <p:spPr/>
-        <p:txBody>
-          <a:bodyPr/>
-          <a:lstStyle/>
-          <a:p>
-            <a:r>
-              <a:rPr lang="en-US" dirty="0"/>
-              <a:t>Model build</a:t>
-            </a:r>
-          </a:p>
-          <a:p>
-            <a:pPr lvl="1"/>
-            <a:r>
-              <a:rPr lang="en-US" sz="2000" dirty="0" err="1">
-                <a:latin typeface="Consolas" panose="020B0609020204030204" pitchFamily="49" charset="0"/>
-                <a:cs typeface="Consolas" panose="020B0609020204030204" pitchFamily="49" charset="0"/>
-              </a:rPr>
-              <a:t>keras_utils</a:t>
-            </a:r>
-            <a:r>
-              <a:rPr lang="en-US" dirty="0">
-                <a:latin typeface="Consolas" panose="020B0609020204030204" pitchFamily="49" charset="0"/>
-                <a:cs typeface="Consolas" panose="020B0609020204030204" pitchFamily="49" charset="0"/>
-              </a:rPr>
-              <a:t> </a:t>
-            </a:r>
-            <a:r>
-              <a:rPr lang="en-US" dirty="0"/>
-              <a:t>translates CANDLE keywords into Keras methods</a:t>
-            </a:r>
-          </a:p>
-          <a:p>
-            <a:pPr lvl="2"/>
-            <a:r>
-              <a:rPr lang="en-US" dirty="0"/>
-              <a:t>e.g. optimizer, initializer specification</a:t>
-            </a:r>
-          </a:p>
-          <a:p>
-            <a:pPr lvl="1"/>
-            <a:r>
-              <a:rPr lang="en-US" dirty="0"/>
-              <a:t>Extends Keras functionality where useful</a:t>
-            </a:r>
-          </a:p>
-          <a:p>
-            <a:pPr lvl="2"/>
-            <a:r>
-              <a:rPr lang="en-US" dirty="0" err="1">
-                <a:latin typeface="Consolas" panose="020B0609020204030204" pitchFamily="49" charset="0"/>
-                <a:cs typeface="Consolas" panose="020B0609020204030204" pitchFamily="49" charset="0"/>
-              </a:rPr>
-              <a:t>PermanentDropout</a:t>
-            </a:r>
-            <a:endParaRPr lang="en-US" dirty="0">
-              <a:latin typeface="Consolas" panose="020B0609020204030204" pitchFamily="49" charset="0"/>
-              <a:cs typeface="Consolas" panose="020B0609020204030204" pitchFamily="49" charset="0"/>
-            </a:endParaRPr>
-          </a:p>
-          <a:p>
-            <a:pPr lvl="1"/>
-            <a:r>
-              <a:rPr lang="en-US" sz="2000" dirty="0" err="1">
-                <a:latin typeface="Consolas" panose="020B0609020204030204" pitchFamily="49" charset="0"/>
-                <a:cs typeface="Consolas" panose="020B0609020204030204" pitchFamily="49" charset="0"/>
-              </a:rPr>
-              <a:t>default_utils</a:t>
-            </a:r>
-            <a:r>
-              <a:rPr lang="en-US" sz="2000" dirty="0">
-                <a:latin typeface="Consolas" panose="020B0609020204030204" pitchFamily="49" charset="0"/>
-                <a:cs typeface="Consolas" panose="020B0609020204030204" pitchFamily="49" charset="0"/>
-              </a:rPr>
-              <a:t> </a:t>
-            </a:r>
-          </a:p>
-          <a:p>
-            <a:pPr lvl="2"/>
-            <a:r>
-              <a:rPr lang="en-US" dirty="0">
-                <a:latin typeface="+mn-lt"/>
-              </a:rPr>
-              <a:t>Adds default </a:t>
-            </a:r>
-            <a:r>
-              <a:rPr lang="en-US" sz="1600" dirty="0">
-                <a:latin typeface="Consolas" panose="020B0609020204030204" pitchFamily="49" charset="0"/>
-                <a:cs typeface="Consolas" panose="020B0609020204030204" pitchFamily="49" charset="0"/>
-              </a:rPr>
-              <a:t>EXP000</a:t>
-            </a:r>
-            <a:r>
-              <a:rPr lang="en-US" dirty="0">
-                <a:latin typeface="+mn-lt"/>
-              </a:rPr>
-              <a:t> and </a:t>
-            </a:r>
-            <a:r>
-              <a:rPr lang="en-US" sz="1600" dirty="0">
-                <a:latin typeface="Consolas" panose="020B0609020204030204" pitchFamily="49" charset="0"/>
-                <a:cs typeface="Consolas" panose="020B0609020204030204" pitchFamily="49" charset="0"/>
-              </a:rPr>
-              <a:t>RUN000</a:t>
-            </a:r>
-            <a:r>
-              <a:rPr lang="en-US" dirty="0">
-                <a:latin typeface="+mn-lt"/>
-              </a:rPr>
-              <a:t> directory structure </a:t>
-            </a:r>
-          </a:p>
-          <a:p>
-            <a:pPr lvl="2"/>
-            <a:r>
-              <a:rPr lang="en-US" dirty="0">
-                <a:latin typeface="+mn-lt"/>
-              </a:rPr>
-              <a:t>Adds default values, command line parsing</a:t>
-            </a:r>
-          </a:p>
-          <a:p>
-            <a:pPr lvl="1"/>
-            <a:r>
-              <a:rPr lang="en-US" sz="2000" dirty="0" err="1">
-                <a:latin typeface="Consolas" panose="020B0609020204030204" pitchFamily="49" charset="0"/>
-                <a:cs typeface="Consolas" panose="020B0609020204030204" pitchFamily="49" charset="0"/>
-              </a:rPr>
-              <a:t>solr_keras</a:t>
-            </a:r>
-            <a:r>
-              <a:rPr lang="en-US" sz="2000" dirty="0">
-                <a:latin typeface="Consolas" panose="020B0609020204030204" pitchFamily="49" charset="0"/>
-                <a:cs typeface="Consolas" panose="020B0609020204030204" pitchFamily="49" charset="0"/>
-              </a:rPr>
-              <a:t> </a:t>
-            </a:r>
-            <a:r>
-              <a:rPr lang="en-US" dirty="0"/>
-              <a:t>adds monitoring and logging</a:t>
-            </a:r>
-          </a:p>
-          <a:p>
-            <a:pPr lvl="2"/>
-            <a:r>
-              <a:rPr lang="en-US" dirty="0">
-                <a:latin typeface="+mn-lt"/>
-              </a:rPr>
-              <a:t>Timeout functionality to respect job limits</a:t>
-            </a:r>
-          </a:p>
-          <a:p>
-            <a:pPr marL="346075" lvl="1" indent="0">
-              <a:buNone/>
-            </a:pPr>
-            <a:endParaRPr lang="en-US" dirty="0">
-              <a:latin typeface="+mn-lt"/>
-            </a:endParaRPr>
-          </a:p>
-        </p:txBody>
-      </p:sp>
-    </p:spTree>
-    <p:extLst>
-      <p:ext uri="{BB962C8B-B14F-4D97-AF65-F5344CB8AC3E}">
-        <p14:creationId xmlns:p14="http://schemas.microsoft.com/office/powerpoint/2010/main" val="4024632629"/>
+        <p14:creationId xmlns:p14="http://schemas.microsoft.com/office/powerpoint/2010/main" val="1264112038"/>
       </p:ext>
     </p:extLst>
   </p:cSld>
@@ -9027,12 +8658,6 @@
 </file>
 
 <file path=customXml/item1.xml><?xml version="1.0" encoding="utf-8"?>
-<p:properties xmlns:p="http://schemas.microsoft.com/office/2006/metadata/properties" xmlns:xsi="http://www.w3.org/2001/XMLSchema-instance" xmlns:pc="http://schemas.microsoft.com/office/infopath/2007/PartnerControls">
-  <documentManagement/>
-</p:properties>
-</file>
-
-<file path=customXml/item2.xml><?xml version="1.0" encoding="utf-8"?>
 <?mso-contentType ?>
 <FormTemplates xmlns="http://schemas.microsoft.com/sharepoint/v3/contenttype/forms">
   <Display>DocumentLibraryForm</Display>
@@ -9041,7 +8666,7 @@
 </FormTemplates>
 </file>
 
-<file path=customXml/item3.xml><?xml version="1.0" encoding="utf-8"?>
+<file path=customXml/item2.xml><?xml version="1.0" encoding="utf-8"?>
 <ct:contentTypeSchema xmlns:ct="http://schemas.microsoft.com/office/2006/metadata/contentType" xmlns:ma="http://schemas.microsoft.com/office/2006/metadata/properties/metaAttributes" ct:_="" ma:_="" ma:contentTypeName="Document" ma:contentTypeID="0x010100693156C96291C349BBF8B640319D465D" ma:contentTypeVersion="0" ma:contentTypeDescription="Create a new document." ma:contentTypeScope="" ma:versionID="8a71be8d30b42e8e74cf70a4a4cbda4c">
   <xsd:schema xmlns:xsd="http://www.w3.org/2001/XMLSchema" xmlns:p="http://schemas.microsoft.com/office/2006/metadata/properties" targetNamespace="http://schemas.microsoft.com/office/2006/metadata/properties" ma:root="true" ma:fieldsID="4aeb20c0e3442673af7ee10786458764">
     <xsd:element name="properties">
@@ -9090,7 +8715,36 @@
 </ct:contentTypeSchema>
 </file>
 
+<file path=customXml/item3.xml><?xml version="1.0" encoding="utf-8"?>
+<p:properties xmlns:p="http://schemas.microsoft.com/office/2006/metadata/properties" xmlns:xsi="http://www.w3.org/2001/XMLSchema-instance" xmlns:pc="http://schemas.microsoft.com/office/infopath/2007/PartnerControls">
+  <documentManagement/>
+</p:properties>
+</file>
+
 <file path=customXml/itemProps1.xml><?xml version="1.0" encoding="utf-8"?>
+<ds:datastoreItem xmlns:ds="http://schemas.openxmlformats.org/officeDocument/2006/customXml" ds:itemID="{19E20559-B232-4371-8690-E3D8007EDB82}">
+  <ds:schemaRefs>
+    <ds:schemaRef ds:uri="http://schemas.microsoft.com/sharepoint/v3/contenttype/forms"/>
+  </ds:schemaRefs>
+</ds:datastoreItem>
+</file>
+
+<file path=customXml/itemProps2.xml><?xml version="1.0" encoding="utf-8"?>
+<ds:datastoreItem xmlns:ds="http://schemas.openxmlformats.org/officeDocument/2006/customXml" ds:itemID="{D85F602D-FF92-4BDD-B4C2-093468CCF754}">
+  <ds:schemaRefs>
+    <ds:schemaRef ds:uri="http://schemas.microsoft.com/office/2006/metadata/contentType"/>
+    <ds:schemaRef ds:uri="http://schemas.microsoft.com/office/2006/metadata/properties/metaAttributes"/>
+    <ds:schemaRef ds:uri="http://www.w3.org/2001/XMLSchema"/>
+    <ds:schemaRef ds:uri="http://schemas.microsoft.com/office/2006/metadata/properties"/>
+    <ds:schemaRef ds:uri="http://schemas.openxmlformats.org/package/2006/metadata/core-properties"/>
+    <ds:schemaRef ds:uri="http://purl.org/dc/elements/1.1/"/>
+    <ds:schemaRef ds:uri="http://purl.org/dc/terms/"/>
+    <ds:schemaRef ds:uri="http://schemas.microsoft.com/office/internal/2005/internalDocumentation"/>
+  </ds:schemaRefs>
+</ds:datastoreItem>
+</file>
+
+<file path=customXml/itemProps3.xml><?xml version="1.0" encoding="utf-8"?>
 <ds:datastoreItem xmlns:ds="http://schemas.openxmlformats.org/officeDocument/2006/customXml" ds:itemID="{A50EC660-24D0-43A0-AE5E-E274115E726B}">
   <ds:schemaRefs>
     <ds:schemaRef ds:uri="http://purl.org/dc/dcmitype/"/>
@@ -9103,27 +8757,4 @@
     <ds:schemaRef ds:uri="http://schemas.microsoft.com/office/infopath/2007/PartnerControls"/>
   </ds:schemaRefs>
 </ds:datastoreItem>
-</file>
-
-<file path=customXml/itemProps2.xml><?xml version="1.0" encoding="utf-8"?>
-<ds:datastoreItem xmlns:ds="http://schemas.openxmlformats.org/officeDocument/2006/customXml" ds:itemID="{19E20559-B232-4371-8690-E3D8007EDB82}">
-  <ds:schemaRefs>
-    <ds:schemaRef ds:uri="http://schemas.microsoft.com/sharepoint/v3/contenttype/forms"/>
-  </ds:schemaRefs>
-</ds:datastoreItem>
-</file>
-
-<file path=customXml/itemProps3.xml><?xml version="1.0" encoding="utf-8"?>
-<ds:datastoreItem xmlns:ds="http://schemas.openxmlformats.org/officeDocument/2006/customXml" ds:itemID="{D85F602D-FF92-4BDD-B4C2-093468CCF754}">
-  <ds:schemaRefs>
-    <ds:schemaRef ds:uri="http://schemas.microsoft.com/office/2006/metadata/contentType"/>
-    <ds:schemaRef ds:uri="http://schemas.microsoft.com/office/2006/metadata/properties/metaAttributes"/>
-    <ds:schemaRef ds:uri="http://www.w3.org/2001/XMLSchema"/>
-    <ds:schemaRef ds:uri="http://schemas.microsoft.com/office/2006/metadata/properties"/>
-    <ds:schemaRef ds:uri="http://schemas.openxmlformats.org/package/2006/metadata/core-properties"/>
-    <ds:schemaRef ds:uri="http://purl.org/dc/elements/1.1/"/>
-    <ds:schemaRef ds:uri="http://purl.org/dc/terms/"/>
-    <ds:schemaRef ds:uri="http://schemas.microsoft.com/office/internal/2005/internalDocumentation"/>
-  </ds:schemaRefs>
-</ds:datastoreItem>
 </file>
</xml_diff>